<commit_message>
add 2020 lecture 2
</commit_message>
<xml_diff>
--- a/course/compiler/lecture/(Spring2020)Lecture2.pptx
+++ b/course/compiler/lecture/(Spring2020)Lecture2.pptx
@@ -5823,7 +5823,7 @@
           <a:graphicData uri="http://schemas.openxmlformats.org/presentationml/2006/ole">
             <mc:AlternateContent xmlns:mc="http://schemas.openxmlformats.org/markup-compatibility/2006">
               <mc:Choice xmlns:v="urn:schemas-microsoft-com:vml" Requires="v">
-                <p:oleObj spid="_x0000_s6211" name="Equation" r:id="rId3" imgW="507960" imgH="203040" progId="Equation.DSMT4">
+                <p:oleObj spid="_x0000_s6213" name="Equation" r:id="rId3" imgW="507960" imgH="203040" progId="Equation.DSMT4">
                   <p:embed/>
                 </p:oleObj>
               </mc:Choice>
@@ -5880,7 +5880,7 @@
           <a:graphicData uri="http://schemas.openxmlformats.org/presentationml/2006/ole">
             <mc:AlternateContent xmlns:mc="http://schemas.openxmlformats.org/markup-compatibility/2006">
               <mc:Choice xmlns:v="urn:schemas-microsoft-com:vml" Requires="v">
-                <p:oleObj spid="_x0000_s6212" name="Equation" r:id="rId5" imgW="1752480" imgH="241200" progId="Equation.DSMT4">
+                <p:oleObj spid="_x0000_s6214" name="Equation" r:id="rId5" imgW="1752480" imgH="241200" progId="Equation.DSMT4">
                   <p:embed/>
                 </p:oleObj>
               </mc:Choice>
@@ -6122,7 +6122,7 @@
           <a:graphicData uri="http://schemas.openxmlformats.org/presentationml/2006/ole">
             <mc:AlternateContent xmlns:mc="http://schemas.openxmlformats.org/markup-compatibility/2006">
               <mc:Choice xmlns:v="urn:schemas-microsoft-com:vml" Requires="v">
-                <p:oleObj spid="_x0000_s7290" name="Equation" r:id="rId3" imgW="469800" imgH="203040" progId="Equation.DSMT4">
+                <p:oleObj spid="_x0000_s7294" name="Equation" r:id="rId3" imgW="469800" imgH="203040" progId="Equation.DSMT4">
                   <p:embed/>
                 </p:oleObj>
               </mc:Choice>
@@ -6179,7 +6179,7 @@
           <a:graphicData uri="http://schemas.openxmlformats.org/presentationml/2006/ole">
             <mc:AlternateContent xmlns:mc="http://schemas.openxmlformats.org/markup-compatibility/2006">
               <mc:Choice xmlns:v="urn:schemas-microsoft-com:vml" Requires="v">
-                <p:oleObj spid="_x0000_s7291" name="Equation" r:id="rId5" imgW="152280" imgH="139680" progId="Equation.DSMT4">
+                <p:oleObj spid="_x0000_s7295" name="Equation" r:id="rId5" imgW="152280" imgH="139680" progId="Equation.DSMT4">
                   <p:embed/>
                 </p:oleObj>
               </mc:Choice>
@@ -6236,7 +6236,7 @@
           <a:graphicData uri="http://schemas.openxmlformats.org/presentationml/2006/ole">
             <mc:AlternateContent xmlns:mc="http://schemas.openxmlformats.org/markup-compatibility/2006">
               <mc:Choice xmlns:v="urn:schemas-microsoft-com:vml" Requires="v">
-                <p:oleObj spid="_x0000_s7292" name="Equation" r:id="rId7" imgW="583920" imgH="228600" progId="Equation.DSMT4">
+                <p:oleObj spid="_x0000_s7296" name="Equation" r:id="rId7" imgW="583920" imgH="228600" progId="Equation.DSMT4">
                   <p:embed/>
                 </p:oleObj>
               </mc:Choice>
@@ -6293,7 +6293,7 @@
           <a:graphicData uri="http://schemas.openxmlformats.org/presentationml/2006/ole">
             <mc:AlternateContent xmlns:mc="http://schemas.openxmlformats.org/markup-compatibility/2006">
               <mc:Choice xmlns:v="urn:schemas-microsoft-com:vml" Requires="v">
-                <p:oleObj spid="_x0000_s7293" name="Equation" r:id="rId9" imgW="596880" imgH="228600" progId="Equation.DSMT4">
+                <p:oleObj spid="_x0000_s7297" name="Equation" r:id="rId9" imgW="596880" imgH="228600" progId="Equation.DSMT4">
                   <p:embed/>
                 </p:oleObj>
               </mc:Choice>
@@ -6451,7 +6451,7 @@
           <a:graphicData uri="http://schemas.openxmlformats.org/presentationml/2006/ole">
             <mc:AlternateContent xmlns:mc="http://schemas.openxmlformats.org/markup-compatibility/2006">
               <mc:Choice xmlns:v="urn:schemas-microsoft-com:vml" Requires="v">
-                <p:oleObj spid="_x0000_s9286" name="Equation" r:id="rId3" imgW="647640" imgH="177480" progId="Equation.DSMT4">
+                <p:oleObj spid="_x0000_s9291" name="Equation" r:id="rId3" imgW="647640" imgH="177480" progId="Equation.DSMT4">
                   <p:embed/>
                 </p:oleObj>
               </mc:Choice>
@@ -6995,7 +6995,7 @@
           <a:graphicData uri="http://schemas.openxmlformats.org/presentationml/2006/ole">
             <mc:AlternateContent xmlns:mc="http://schemas.openxmlformats.org/markup-compatibility/2006">
               <mc:Choice xmlns:v="urn:schemas-microsoft-com:vml" Requires="v">
-                <p:oleObj spid="_x0000_s9287" name="Equation" r:id="rId5" imgW="126720" imgH="139680" progId="Equation.DSMT4">
+                <p:oleObj spid="_x0000_s9292" name="Equation" r:id="rId5" imgW="126720" imgH="139680" progId="Equation.DSMT4">
                   <p:embed/>
                 </p:oleObj>
               </mc:Choice>
@@ -7052,7 +7052,7 @@
           <a:graphicData uri="http://schemas.openxmlformats.org/presentationml/2006/ole">
             <mc:AlternateContent xmlns:mc="http://schemas.openxmlformats.org/markup-compatibility/2006">
               <mc:Choice xmlns:v="urn:schemas-microsoft-com:vml" Requires="v">
-                <p:oleObj spid="_x0000_s9288" name="Equation" r:id="rId7" imgW="1041120" imgH="228600" progId="Equation.DSMT4">
+                <p:oleObj spid="_x0000_s9293" name="Equation" r:id="rId7" imgW="1041120" imgH="228600" progId="Equation.DSMT4">
                   <p:embed/>
                 </p:oleObj>
               </mc:Choice>
@@ -7109,7 +7109,7 @@
           <a:graphicData uri="http://schemas.openxmlformats.org/presentationml/2006/ole">
             <mc:AlternateContent xmlns:mc="http://schemas.openxmlformats.org/markup-compatibility/2006">
               <mc:Choice xmlns:v="urn:schemas-microsoft-com:vml" Requires="v">
-                <p:oleObj spid="_x0000_s9289" name="Equation" r:id="rId9" imgW="444240" imgH="177480" progId="Equation.DSMT4">
+                <p:oleObj spid="_x0000_s9294" name="Equation" r:id="rId9" imgW="444240" imgH="177480" progId="Equation.DSMT4">
                   <p:embed/>
                 </p:oleObj>
               </mc:Choice>
@@ -7166,7 +7166,7 @@
           <a:graphicData uri="http://schemas.openxmlformats.org/presentationml/2006/ole">
             <mc:AlternateContent xmlns:mc="http://schemas.openxmlformats.org/markup-compatibility/2006">
               <mc:Choice xmlns:v="urn:schemas-microsoft-com:vml" Requires="v">
-                <p:oleObj spid="_x0000_s9290" name="Equation" r:id="rId11" imgW="126720" imgH="139680" progId="Equation.DSMT4">
+                <p:oleObj spid="_x0000_s9295" name="Equation" r:id="rId11" imgW="126720" imgH="139680" progId="Equation.DSMT4">
                   <p:embed/>
                 </p:oleObj>
               </mc:Choice>
@@ -7889,7 +7889,7 @@
           <a:graphicData uri="http://schemas.openxmlformats.org/presentationml/2006/ole">
             <mc:AlternateContent xmlns:mc="http://schemas.openxmlformats.org/markup-compatibility/2006">
               <mc:Choice xmlns:v="urn:schemas-microsoft-com:vml" Requires="v">
-                <p:oleObj spid="_x0000_s8408" name="Equation" r:id="rId4" imgW="1117440" imgH="228600" progId="Equation.DSMT4">
+                <p:oleObj spid="_x0000_s8418" name="Equation" r:id="rId4" imgW="1117440" imgH="228600" progId="Equation.DSMT4">
                   <p:embed/>
                 </p:oleObj>
               </mc:Choice>
@@ -7946,7 +7946,7 @@
           <a:graphicData uri="http://schemas.openxmlformats.org/presentationml/2006/ole">
             <mc:AlternateContent xmlns:mc="http://schemas.openxmlformats.org/markup-compatibility/2006">
               <mc:Choice xmlns:v="urn:schemas-microsoft-com:vml" Requires="v">
-                <p:oleObj spid="_x0000_s8409" name="Equation" r:id="rId6" imgW="469800" imgH="203040" progId="Equation.DSMT4">
+                <p:oleObj spid="_x0000_s8419" name="Equation" r:id="rId6" imgW="469800" imgH="203040" progId="Equation.DSMT4">
                   <p:embed/>
                 </p:oleObj>
               </mc:Choice>
@@ -8003,7 +8003,7 @@
           <a:graphicData uri="http://schemas.openxmlformats.org/presentationml/2006/ole">
             <mc:AlternateContent xmlns:mc="http://schemas.openxmlformats.org/markup-compatibility/2006">
               <mc:Choice xmlns:v="urn:schemas-microsoft-com:vml" Requires="v">
-                <p:oleObj spid="_x0000_s8410" name="Equation" r:id="rId8" imgW="914400" imgH="241200" progId="Equation.DSMT4">
+                <p:oleObj spid="_x0000_s8420" name="Equation" r:id="rId8" imgW="914400" imgH="241200" progId="Equation.DSMT4">
                   <p:embed/>
                 </p:oleObj>
               </mc:Choice>
@@ -8060,7 +8060,7 @@
           <a:graphicData uri="http://schemas.openxmlformats.org/presentationml/2006/ole">
             <mc:AlternateContent xmlns:mc="http://schemas.openxmlformats.org/markup-compatibility/2006">
               <mc:Choice xmlns:v="urn:schemas-microsoft-com:vml" Requires="v">
-                <p:oleObj spid="_x0000_s8411" name="Equation" r:id="rId10" imgW="914400" imgH="241200" progId="Equation.DSMT4">
+                <p:oleObj spid="_x0000_s8421" name="Equation" r:id="rId10" imgW="914400" imgH="241200" progId="Equation.DSMT4">
                   <p:embed/>
                 </p:oleObj>
               </mc:Choice>
@@ -8117,7 +8117,7 @@
           <a:graphicData uri="http://schemas.openxmlformats.org/presentationml/2006/ole">
             <mc:AlternateContent xmlns:mc="http://schemas.openxmlformats.org/markup-compatibility/2006">
               <mc:Choice xmlns:v="urn:schemas-microsoft-com:vml" Requires="v">
-                <p:oleObj spid="_x0000_s8412" name="Equation" r:id="rId12" imgW="469800" imgH="203040" progId="Equation.DSMT4">
+                <p:oleObj spid="_x0000_s8422" name="Equation" r:id="rId12" imgW="469800" imgH="203040" progId="Equation.DSMT4">
                   <p:embed/>
                 </p:oleObj>
               </mc:Choice>
@@ -8174,7 +8174,7 @@
           <a:graphicData uri="http://schemas.openxmlformats.org/presentationml/2006/ole">
             <mc:AlternateContent xmlns:mc="http://schemas.openxmlformats.org/markup-compatibility/2006">
               <mc:Choice xmlns:v="urn:schemas-microsoft-com:vml" Requires="v">
-                <p:oleObj spid="_x0000_s8413" name="Equation" r:id="rId13" imgW="558720" imgH="253800" progId="Equation.DSMT4">
+                <p:oleObj spid="_x0000_s8423" name="Equation" r:id="rId13" imgW="558720" imgH="253800" progId="Equation.DSMT4">
                   <p:embed/>
                 </p:oleObj>
               </mc:Choice>
@@ -8231,7 +8231,7 @@
           <a:graphicData uri="http://schemas.openxmlformats.org/presentationml/2006/ole">
             <mc:AlternateContent xmlns:mc="http://schemas.openxmlformats.org/markup-compatibility/2006">
               <mc:Choice xmlns:v="urn:schemas-microsoft-com:vml" Requires="v">
-                <p:oleObj spid="_x0000_s8414" name="Equation" r:id="rId15" imgW="431640" imgH="177480" progId="Equation.DSMT4">
+                <p:oleObj spid="_x0000_s8424" name="Equation" r:id="rId15" imgW="431640" imgH="177480" progId="Equation.DSMT4">
                   <p:embed/>
                 </p:oleObj>
               </mc:Choice>
@@ -8288,7 +8288,7 @@
           <a:graphicData uri="http://schemas.openxmlformats.org/presentationml/2006/ole">
             <mc:AlternateContent xmlns:mc="http://schemas.openxmlformats.org/markup-compatibility/2006">
               <mc:Choice xmlns:v="urn:schemas-microsoft-com:vml" Requires="v">
-                <p:oleObj spid="_x0000_s8415" name="Equation" r:id="rId17" imgW="1866600" imgH="241200" progId="Equation.DSMT4">
+                <p:oleObj spid="_x0000_s8425" name="Equation" r:id="rId17" imgW="1866600" imgH="241200" progId="Equation.DSMT4">
                   <p:embed/>
                 </p:oleObj>
               </mc:Choice>
@@ -8345,7 +8345,7 @@
           <a:graphicData uri="http://schemas.openxmlformats.org/presentationml/2006/ole">
             <mc:AlternateContent xmlns:mc="http://schemas.openxmlformats.org/markup-compatibility/2006">
               <mc:Choice xmlns:v="urn:schemas-microsoft-com:vml" Requires="v">
-                <p:oleObj spid="_x0000_s8416" name="Equation" r:id="rId19" imgW="2247840" imgH="241200" progId="Equation.DSMT4">
+                <p:oleObj spid="_x0000_s8426" name="Equation" r:id="rId19" imgW="2247840" imgH="241200" progId="Equation.DSMT4">
                   <p:embed/>
                 </p:oleObj>
               </mc:Choice>
@@ -8402,7 +8402,7 @@
           <a:graphicData uri="http://schemas.openxmlformats.org/presentationml/2006/ole">
             <mc:AlternateContent xmlns:mc="http://schemas.openxmlformats.org/markup-compatibility/2006">
               <mc:Choice xmlns:v="urn:schemas-microsoft-com:vml" Requires="v">
-                <p:oleObj spid="_x0000_s8417" name="Equation" r:id="rId21" imgW="2247840" imgH="241200" progId="Equation.DSMT4">
+                <p:oleObj spid="_x0000_s8427" name="Equation" r:id="rId21" imgW="2247840" imgH="241200" progId="Equation.DSMT4">
                   <p:embed/>
                 </p:oleObj>
               </mc:Choice>
@@ -8566,7 +8566,7 @@
           <a:graphicData uri="http://schemas.openxmlformats.org/presentationml/2006/ole">
             <mc:AlternateContent xmlns:mc="http://schemas.openxmlformats.org/markup-compatibility/2006">
               <mc:Choice xmlns:v="urn:schemas-microsoft-com:vml" Requires="v">
-                <p:oleObj spid="_x0000_s10259" name="Equation" r:id="rId3" imgW="1828800" imgH="431800" progId="Equation.DSMT4">
+                <p:oleObj spid="_x0000_s10261" name="Equation" r:id="rId3" imgW="1828800" imgH="431800" progId="Equation.DSMT4">
                   <p:embed/>
                 </p:oleObj>
               </mc:Choice>
@@ -8633,7 +8633,7 @@
           <a:graphicData uri="http://schemas.openxmlformats.org/presentationml/2006/ole">
             <mc:AlternateContent xmlns:mc="http://schemas.openxmlformats.org/markup-compatibility/2006">
               <mc:Choice xmlns:v="urn:schemas-microsoft-com:vml" Requires="v">
-                <p:oleObj spid="_x0000_s10260" name="Equation" r:id="rId5" imgW="1587500" imgH="990600" progId="Equation.DSMT4">
+                <p:oleObj spid="_x0000_s10262" name="Equation" r:id="rId5" imgW="1587500" imgH="990600" progId="Equation.DSMT4">
                   <p:embed/>
                 </p:oleObj>
               </mc:Choice>
@@ -11030,7 +11030,7 @@
           <a:graphicData uri="http://schemas.openxmlformats.org/presentationml/2006/ole">
             <mc:AlternateContent xmlns:mc="http://schemas.openxmlformats.org/markup-compatibility/2006">
               <mc:Choice xmlns:v="urn:schemas-microsoft-com:vml" Requires="v">
-                <p:oleObj spid="_x0000_s2742" name="Equation" r:id="rId3" imgW="139680" imgH="152280" progId="Equation.DSMT4">
+                <p:oleObj spid="_x0000_s2752" name="Equation" r:id="rId3" imgW="139680" imgH="152280" progId="Equation.DSMT4">
                   <p:embed/>
                 </p:oleObj>
               </mc:Choice>
@@ -11087,7 +11087,7 @@
           <a:graphicData uri="http://schemas.openxmlformats.org/presentationml/2006/ole">
             <mc:AlternateContent xmlns:mc="http://schemas.openxmlformats.org/markup-compatibility/2006">
               <mc:Choice xmlns:v="urn:schemas-microsoft-com:vml" Requires="v">
-                <p:oleObj spid="_x0000_s2743" name="Equation" r:id="rId5" imgW="139680" imgH="152280" progId="Equation.DSMT4">
+                <p:oleObj spid="_x0000_s2753" name="Equation" r:id="rId5" imgW="139680" imgH="152280" progId="Equation.DSMT4">
                   <p:embed/>
                 </p:oleObj>
               </mc:Choice>
@@ -11144,7 +11144,7 @@
           <a:graphicData uri="http://schemas.openxmlformats.org/presentationml/2006/ole">
             <mc:AlternateContent xmlns:mc="http://schemas.openxmlformats.org/markup-compatibility/2006">
               <mc:Choice xmlns:v="urn:schemas-microsoft-com:vml" Requires="v">
-                <p:oleObj spid="_x0000_s2744" name="Equation" r:id="rId7" imgW="139680" imgH="152280" progId="Equation.DSMT4">
+                <p:oleObj spid="_x0000_s2754" name="Equation" r:id="rId7" imgW="139680" imgH="152280" progId="Equation.DSMT4">
                   <p:embed/>
                 </p:oleObj>
               </mc:Choice>
@@ -11201,7 +11201,7 @@
           <a:graphicData uri="http://schemas.openxmlformats.org/presentationml/2006/ole">
             <mc:AlternateContent xmlns:mc="http://schemas.openxmlformats.org/markup-compatibility/2006">
               <mc:Choice xmlns:v="urn:schemas-microsoft-com:vml" Requires="v">
-                <p:oleObj spid="_x0000_s2745" name="Equation" r:id="rId8" imgW="203040" imgH="164880" progId="Equation.DSMT4">
+                <p:oleObj spid="_x0000_s2755" name="Equation" r:id="rId8" imgW="203040" imgH="164880" progId="Equation.DSMT4">
                   <p:embed/>
                 </p:oleObj>
               </mc:Choice>
@@ -11258,7 +11258,7 @@
           <a:graphicData uri="http://schemas.openxmlformats.org/presentationml/2006/ole">
             <mc:AlternateContent xmlns:mc="http://schemas.openxmlformats.org/markup-compatibility/2006">
               <mc:Choice xmlns:v="urn:schemas-microsoft-com:vml" Requires="v">
-                <p:oleObj spid="_x0000_s2746" name="Equation" r:id="rId10" imgW="139680" imgH="152280" progId="Equation.DSMT4">
+                <p:oleObj spid="_x0000_s2756" name="Equation" r:id="rId10" imgW="139680" imgH="152280" progId="Equation.DSMT4">
                   <p:embed/>
                 </p:oleObj>
               </mc:Choice>
@@ -11315,7 +11315,7 @@
           <a:graphicData uri="http://schemas.openxmlformats.org/presentationml/2006/ole">
             <mc:AlternateContent xmlns:mc="http://schemas.openxmlformats.org/markup-compatibility/2006">
               <mc:Choice xmlns:v="urn:schemas-microsoft-com:vml" Requires="v">
-                <p:oleObj spid="_x0000_s2747" name="Equation" r:id="rId12" imgW="1676160" imgH="203040" progId="Equation.DSMT4">
+                <p:oleObj spid="_x0000_s2757" name="Equation" r:id="rId12" imgW="1676160" imgH="203040" progId="Equation.DSMT4">
                   <p:embed/>
                 </p:oleObj>
               </mc:Choice>
@@ -11372,7 +11372,7 @@
           <a:graphicData uri="http://schemas.openxmlformats.org/presentationml/2006/ole">
             <mc:AlternateContent xmlns:mc="http://schemas.openxmlformats.org/markup-compatibility/2006">
               <mc:Choice xmlns:v="urn:schemas-microsoft-com:vml" Requires="v">
-                <p:oleObj spid="_x0000_s2748" name="Equation" r:id="rId14" imgW="850680" imgH="393480" progId="Equation.DSMT4">
+                <p:oleObj spid="_x0000_s2758" name="Equation" r:id="rId14" imgW="850680" imgH="393480" progId="Equation.DSMT4">
                   <p:embed/>
                 </p:oleObj>
               </mc:Choice>
@@ -11429,7 +11429,7 @@
           <a:graphicData uri="http://schemas.openxmlformats.org/presentationml/2006/ole">
             <mc:AlternateContent xmlns:mc="http://schemas.openxmlformats.org/markup-compatibility/2006">
               <mc:Choice xmlns:v="urn:schemas-microsoft-com:vml" Requires="v">
-                <p:oleObj spid="_x0000_s2749" name="Equation" r:id="rId16" imgW="558720" imgH="228600" progId="Equation.DSMT4">
+                <p:oleObj spid="_x0000_s2759" name="Equation" r:id="rId16" imgW="558720" imgH="228600" progId="Equation.DSMT4">
                   <p:embed/>
                 </p:oleObj>
               </mc:Choice>
@@ -11486,7 +11486,7 @@
           <a:graphicData uri="http://schemas.openxmlformats.org/presentationml/2006/ole">
             <mc:AlternateContent xmlns:mc="http://schemas.openxmlformats.org/markup-compatibility/2006">
               <mc:Choice xmlns:v="urn:schemas-microsoft-com:vml" Requires="v">
-                <p:oleObj spid="_x0000_s2750" name="Equation" r:id="rId18" imgW="1638000" imgH="203040" progId="Equation.DSMT4">
+                <p:oleObj spid="_x0000_s2760" name="Equation" r:id="rId18" imgW="1638000" imgH="203040" progId="Equation.DSMT4">
                   <p:embed/>
                 </p:oleObj>
               </mc:Choice>
@@ -11543,7 +11543,7 @@
           <a:graphicData uri="http://schemas.openxmlformats.org/presentationml/2006/ole">
             <mc:AlternateContent xmlns:mc="http://schemas.openxmlformats.org/markup-compatibility/2006">
               <mc:Choice xmlns:v="urn:schemas-microsoft-com:vml" Requires="v">
-                <p:oleObj spid="_x0000_s2751" name="Equation" r:id="rId20" imgW="609480" imgH="203040" progId="Equation.DSMT4">
+                <p:oleObj spid="_x0000_s2761" name="Equation" r:id="rId20" imgW="609480" imgH="203040" progId="Equation.DSMT4">
                   <p:embed/>
                 </p:oleObj>
               </mc:Choice>
@@ -11884,7 +11884,7 @@
           <a:graphicData uri="http://schemas.openxmlformats.org/presentationml/2006/ole">
             <mc:AlternateContent xmlns:mc="http://schemas.openxmlformats.org/markup-compatibility/2006">
               <mc:Choice xmlns:v="urn:schemas-microsoft-com:vml" Requires="v">
-                <p:oleObj spid="_x0000_s3130" name="Equation" r:id="rId3" imgW="3022560" imgH="190440" progId="Equation.DSMT4">
+                <p:oleObj spid="_x0000_s3131" name="Equation" r:id="rId3" imgW="3022560" imgH="190440" progId="Equation.DSMT4">
                   <p:embed/>
                 </p:oleObj>
               </mc:Choice>
@@ -12099,7 +12099,7 @@
           <a:graphicData uri="http://schemas.openxmlformats.org/presentationml/2006/ole">
             <mc:AlternateContent xmlns:mc="http://schemas.openxmlformats.org/markup-compatibility/2006">
               <mc:Choice xmlns:v="urn:schemas-microsoft-com:vml" Requires="v">
-                <p:oleObj spid="_x0000_s4507" name="Equation" r:id="rId3" imgW="850680" imgH="228600" progId="Equation.DSMT4">
+                <p:oleObj spid="_x0000_s4515" name="Equation" r:id="rId3" imgW="850680" imgH="228600" progId="Equation.DSMT4">
                   <p:embed/>
                 </p:oleObj>
               </mc:Choice>
@@ -12156,7 +12156,7 @@
           <a:graphicData uri="http://schemas.openxmlformats.org/presentationml/2006/ole">
             <mc:AlternateContent xmlns:mc="http://schemas.openxmlformats.org/markup-compatibility/2006">
               <mc:Choice xmlns:v="urn:schemas-microsoft-com:vml" Requires="v">
-                <p:oleObj spid="_x0000_s4508" name="Equation" r:id="rId5" imgW="177480" imgH="177480" progId="Equation.DSMT4">
+                <p:oleObj spid="_x0000_s4516" name="Equation" r:id="rId5" imgW="177480" imgH="177480" progId="Equation.DSMT4">
                   <p:embed/>
                 </p:oleObj>
               </mc:Choice>
@@ -12213,7 +12213,7 @@
           <a:graphicData uri="http://schemas.openxmlformats.org/presentationml/2006/ole">
             <mc:AlternateContent xmlns:mc="http://schemas.openxmlformats.org/markup-compatibility/2006">
               <mc:Choice xmlns:v="urn:schemas-microsoft-com:vml" Requires="v">
-                <p:oleObj spid="_x0000_s4509" name="Equation" r:id="rId7" imgW="469800" imgH="177480" progId="Equation.DSMT4">
+                <p:oleObj spid="_x0000_s4517" name="Equation" r:id="rId7" imgW="469800" imgH="177480" progId="Equation.DSMT4">
                   <p:embed/>
                 </p:oleObj>
               </mc:Choice>
@@ -12270,7 +12270,7 @@
           <a:graphicData uri="http://schemas.openxmlformats.org/presentationml/2006/ole">
             <mc:AlternateContent xmlns:mc="http://schemas.openxmlformats.org/markup-compatibility/2006">
               <mc:Choice xmlns:v="urn:schemas-microsoft-com:vml" Requires="v">
-                <p:oleObj spid="_x0000_s4510" name="Equation" r:id="rId9" imgW="1384200" imgH="241200" progId="Equation.DSMT4">
+                <p:oleObj spid="_x0000_s4518" name="Equation" r:id="rId9" imgW="1384200" imgH="241200" progId="Equation.DSMT4">
                   <p:embed/>
                 </p:oleObj>
               </mc:Choice>
@@ -12327,7 +12327,7 @@
           <a:graphicData uri="http://schemas.openxmlformats.org/presentationml/2006/ole">
             <mc:AlternateContent xmlns:mc="http://schemas.openxmlformats.org/markup-compatibility/2006">
               <mc:Choice xmlns:v="urn:schemas-microsoft-com:vml" Requires="v">
-                <p:oleObj spid="_x0000_s4511" name="Equation" r:id="rId11" imgW="711000" imgH="228600" progId="Equation.DSMT4">
+                <p:oleObj spid="_x0000_s4519" name="Equation" r:id="rId11" imgW="711000" imgH="228600" progId="Equation.DSMT4">
                   <p:embed/>
                 </p:oleObj>
               </mc:Choice>
@@ -12575,7 +12575,7 @@
           <a:graphicData uri="http://schemas.openxmlformats.org/presentationml/2006/ole">
             <mc:AlternateContent xmlns:mc="http://schemas.openxmlformats.org/markup-compatibility/2006">
               <mc:Choice xmlns:v="urn:schemas-microsoft-com:vml" Requires="v">
-                <p:oleObj spid="_x0000_s4512" name="Equation" r:id="rId13" imgW="520560" imgH="914400" progId="Equation.DSMT4">
+                <p:oleObj spid="_x0000_s4520" name="Equation" r:id="rId13" imgW="520560" imgH="914400" progId="Equation.DSMT4">
                   <p:embed/>
                 </p:oleObj>
               </mc:Choice>
@@ -12670,7 +12670,7 @@
           <a:graphicData uri="http://schemas.openxmlformats.org/presentationml/2006/ole">
             <mc:AlternateContent xmlns:mc="http://schemas.openxmlformats.org/markup-compatibility/2006">
               <mc:Choice xmlns:v="urn:schemas-microsoft-com:vml" Requires="v">
-                <p:oleObj spid="_x0000_s4513" name="Equation" r:id="rId15" imgW="1091880" imgH="228600" progId="Equation.DSMT4">
+                <p:oleObj spid="_x0000_s4521" name="Equation" r:id="rId15" imgW="1091880" imgH="228600" progId="Equation.DSMT4">
                   <p:embed/>
                 </p:oleObj>
               </mc:Choice>
@@ -12727,7 +12727,7 @@
           <a:graphicData uri="http://schemas.openxmlformats.org/presentationml/2006/ole">
             <mc:AlternateContent xmlns:mc="http://schemas.openxmlformats.org/markup-compatibility/2006">
               <mc:Choice xmlns:v="urn:schemas-microsoft-com:vml" Requires="v">
-                <p:oleObj spid="_x0000_s4514" name="Equation" r:id="rId17" imgW="2145960" imgH="228600" progId="Equation.DSMT4">
+                <p:oleObj spid="_x0000_s4522" name="Equation" r:id="rId17" imgW="2145960" imgH="228600" progId="Equation.DSMT4">
                   <p:embed/>
                 </p:oleObj>
               </mc:Choice>
@@ -13122,7 +13122,7 @@
           <a:graphicData uri="http://schemas.openxmlformats.org/presentationml/2006/ole">
             <mc:AlternateContent xmlns:mc="http://schemas.openxmlformats.org/markup-compatibility/2006">
               <mc:Choice xmlns:v="urn:schemas-microsoft-com:vml" Requires="v">
-                <p:oleObj spid="_x0000_s5642" name="Equation" r:id="rId3" imgW="444240" imgH="203040" progId="Equation.DSMT4">
+                <p:oleObj spid="_x0000_s5655" name="Equation" r:id="rId3" imgW="444240" imgH="203040" progId="Equation.DSMT4">
                   <p:embed/>
                 </p:oleObj>
               </mc:Choice>
@@ -13179,7 +13179,7 @@
           <a:graphicData uri="http://schemas.openxmlformats.org/presentationml/2006/ole">
             <mc:AlternateContent xmlns:mc="http://schemas.openxmlformats.org/markup-compatibility/2006">
               <mc:Choice xmlns:v="urn:schemas-microsoft-com:vml" Requires="v">
-                <p:oleObj spid="_x0000_s5643" name="Equation" r:id="rId5" imgW="355320" imgH="203040" progId="Equation.DSMT4">
+                <p:oleObj spid="_x0000_s5656" name="Equation" r:id="rId5" imgW="355320" imgH="203040" progId="Equation.DSMT4">
                   <p:embed/>
                 </p:oleObj>
               </mc:Choice>
@@ -13236,7 +13236,7 @@
           <a:graphicData uri="http://schemas.openxmlformats.org/presentationml/2006/ole">
             <mc:AlternateContent xmlns:mc="http://schemas.openxmlformats.org/markup-compatibility/2006">
               <mc:Choice xmlns:v="urn:schemas-microsoft-com:vml" Requires="v">
-                <p:oleObj spid="_x0000_s5644" name="Equation" r:id="rId7" imgW="304560" imgH="203040" progId="Equation.DSMT4">
+                <p:oleObj spid="_x0000_s5657" name="Equation" r:id="rId7" imgW="304560" imgH="203040" progId="Equation.DSMT4">
                   <p:embed/>
                 </p:oleObj>
               </mc:Choice>
@@ -13293,7 +13293,7 @@
           <a:graphicData uri="http://schemas.openxmlformats.org/presentationml/2006/ole">
             <mc:AlternateContent xmlns:mc="http://schemas.openxmlformats.org/markup-compatibility/2006">
               <mc:Choice xmlns:v="urn:schemas-microsoft-com:vml" Requires="v">
-                <p:oleObj spid="_x0000_s5645" name="Equation" r:id="rId9" imgW="825480" imgH="203040" progId="Equation.DSMT4">
+                <p:oleObj spid="_x0000_s5658" name="Equation" r:id="rId9" imgW="825480" imgH="203040" progId="Equation.DSMT4">
                   <p:embed/>
                 </p:oleObj>
               </mc:Choice>
@@ -13350,7 +13350,7 @@
           <a:graphicData uri="http://schemas.openxmlformats.org/presentationml/2006/ole">
             <mc:AlternateContent xmlns:mc="http://schemas.openxmlformats.org/markup-compatibility/2006">
               <mc:Choice xmlns:v="urn:schemas-microsoft-com:vml" Requires="v">
-                <p:oleObj spid="_x0000_s5646" name="Equation" r:id="rId11" imgW="1079280" imgH="241200" progId="Equation.DSMT4">
+                <p:oleObj spid="_x0000_s5659" name="Equation" r:id="rId11" imgW="1079280" imgH="241200" progId="Equation.DSMT4">
                   <p:embed/>
                 </p:oleObj>
               </mc:Choice>
@@ -13407,7 +13407,7 @@
           <a:graphicData uri="http://schemas.openxmlformats.org/presentationml/2006/ole">
             <mc:AlternateContent xmlns:mc="http://schemas.openxmlformats.org/markup-compatibility/2006">
               <mc:Choice xmlns:v="urn:schemas-microsoft-com:vml" Requires="v">
-                <p:oleObj spid="_x0000_s5647" name="Equation" r:id="rId13" imgW="190440" imgH="152280" progId="Equation.DSMT4">
+                <p:oleObj spid="_x0000_s5660" name="Equation" r:id="rId13" imgW="190440" imgH="152280" progId="Equation.DSMT4">
                   <p:embed/>
                 </p:oleObj>
               </mc:Choice>
@@ -13464,7 +13464,7 @@
           <a:graphicData uri="http://schemas.openxmlformats.org/presentationml/2006/ole">
             <mc:AlternateContent xmlns:mc="http://schemas.openxmlformats.org/markup-compatibility/2006">
               <mc:Choice xmlns:v="urn:schemas-microsoft-com:vml" Requires="v">
-                <p:oleObj spid="_x0000_s5648" name="Equation" r:id="rId15" imgW="1257120" imgH="228600" progId="Equation.DSMT4">
+                <p:oleObj spid="_x0000_s5661" name="Equation" r:id="rId15" imgW="1257120" imgH="228600" progId="Equation.DSMT4">
                   <p:embed/>
                 </p:oleObj>
               </mc:Choice>
@@ -13521,7 +13521,7 @@
           <a:graphicData uri="http://schemas.openxmlformats.org/presentationml/2006/ole">
             <mc:AlternateContent xmlns:mc="http://schemas.openxmlformats.org/markup-compatibility/2006">
               <mc:Choice xmlns:v="urn:schemas-microsoft-com:vml" Requires="v">
-                <p:oleObj spid="_x0000_s5649" name="Equation" r:id="rId17" imgW="545760" imgH="228600" progId="Equation.DSMT4">
+                <p:oleObj spid="_x0000_s5662" name="Equation" r:id="rId17" imgW="545760" imgH="228600" progId="Equation.DSMT4">
                   <p:embed/>
                 </p:oleObj>
               </mc:Choice>
@@ -13578,7 +13578,7 @@
           <a:graphicData uri="http://schemas.openxmlformats.org/presentationml/2006/ole">
             <mc:AlternateContent xmlns:mc="http://schemas.openxmlformats.org/markup-compatibility/2006">
               <mc:Choice xmlns:v="urn:schemas-microsoft-com:vml" Requires="v">
-                <p:oleObj spid="_x0000_s5650" name="Equation" r:id="rId19" imgW="863280" imgH="228600" progId="Equation.DSMT4">
+                <p:oleObj spid="_x0000_s5663" name="Equation" r:id="rId19" imgW="863280" imgH="228600" progId="Equation.DSMT4">
                   <p:embed/>
                 </p:oleObj>
               </mc:Choice>
@@ -13635,7 +13635,7 @@
           <a:graphicData uri="http://schemas.openxmlformats.org/presentationml/2006/ole">
             <mc:AlternateContent xmlns:mc="http://schemas.openxmlformats.org/markup-compatibility/2006">
               <mc:Choice xmlns:v="urn:schemas-microsoft-com:vml" Requires="v">
-                <p:oleObj spid="_x0000_s5651" name="Equation" r:id="rId21" imgW="241200" imgH="203040" progId="Equation.DSMT4">
+                <p:oleObj spid="_x0000_s5664" name="Equation" r:id="rId21" imgW="241200" imgH="203040" progId="Equation.DSMT4">
                   <p:embed/>
                 </p:oleObj>
               </mc:Choice>
@@ -13692,7 +13692,7 @@
           <a:graphicData uri="http://schemas.openxmlformats.org/presentationml/2006/ole">
             <mc:AlternateContent xmlns:mc="http://schemas.openxmlformats.org/markup-compatibility/2006">
               <mc:Choice xmlns:v="urn:schemas-microsoft-com:vml" Requires="v">
-                <p:oleObj spid="_x0000_s5652" name="Equation" r:id="rId23" imgW="253800" imgH="203040" progId="Equation.DSMT4">
+                <p:oleObj spid="_x0000_s5665" name="Equation" r:id="rId23" imgW="253800" imgH="203040" progId="Equation.DSMT4">
                   <p:embed/>
                 </p:oleObj>
               </mc:Choice>
@@ -13749,7 +13749,7 @@
           <a:graphicData uri="http://schemas.openxmlformats.org/presentationml/2006/ole">
             <mc:AlternateContent xmlns:mc="http://schemas.openxmlformats.org/markup-compatibility/2006">
               <mc:Choice xmlns:v="urn:schemas-microsoft-com:vml" Requires="v">
-                <p:oleObj spid="_x0000_s5653" name="Equation" r:id="rId25" imgW="507960" imgH="203040" progId="Equation.DSMT4">
+                <p:oleObj spid="_x0000_s5666" name="Equation" r:id="rId25" imgW="507960" imgH="203040" progId="Equation.DSMT4">
                   <p:embed/>
                 </p:oleObj>
               </mc:Choice>
@@ -13806,7 +13806,7 @@
           <a:graphicData uri="http://schemas.openxmlformats.org/presentationml/2006/ole">
             <mc:AlternateContent xmlns:mc="http://schemas.openxmlformats.org/markup-compatibility/2006">
               <mc:Choice xmlns:v="urn:schemas-microsoft-com:vml" Requires="v">
-                <p:oleObj spid="_x0000_s5654" name="Equation" r:id="rId27" imgW="152280" imgH="139680" progId="Equation.DSMT4">
+                <p:oleObj spid="_x0000_s5667" name="Equation" r:id="rId27" imgW="152280" imgH="139680" progId="Equation.DSMT4">
                   <p:embed/>
                 </p:oleObj>
               </mc:Choice>
@@ -14614,15 +14614,6 @@
 </file>
 
 <file path=customXml/item1.xml><?xml version="1.0" encoding="utf-8"?>
-<?mso-contentType ?>
-<FormTemplates xmlns="http://schemas.microsoft.com/sharepoint/v3/contenttype/forms">
-  <Display>DocumentLibraryForm</Display>
-  <Edit>AssetEditForm</Edit>
-  <New>DocumentLibraryForm</New>
-</FormTemplates>
-</file>
-
-<file path=customXml/item2.xml><?xml version="1.0" encoding="utf-8"?>
 <p:properties xmlns:p="http://schemas.microsoft.com/office/2006/metadata/properties" xmlns:xsi="http://www.w3.org/2001/XMLSchema-instance" xmlns:pc="http://schemas.microsoft.com/office/infopath/2007/PartnerControls">
   <documentManagement>
     <APDescription xmlns="4873beb7-5857-4685-be1f-d57550cc96cc" xsi:nil="true"/>
@@ -14746,6 +14737,15 @@
     <UANotes xmlns="4873beb7-5857-4685-be1f-d57550cc96cc" xsi:nil="true"/>
   </documentManagement>
 </p:properties>
+</file>
+
+<file path=customXml/item2.xml><?xml version="1.0" encoding="utf-8"?>
+<?mso-contentType ?>
+<FormTemplates xmlns="http://schemas.microsoft.com/sharepoint/v3/contenttype/forms">
+  <Display>DocumentLibraryForm</Display>
+  <Edit>AssetEditForm</Edit>
+  <New>DocumentLibraryForm</New>
+</FormTemplates>
 </file>
 
 <file path=customXml/item3.xml><?xml version="1.0" encoding="utf-8"?>
@@ -15789,14 +15789,6 @@
 </file>
 
 <file path=customXml/itemProps1.xml><?xml version="1.0" encoding="utf-8"?>
-<ds:datastoreItem xmlns:ds="http://schemas.openxmlformats.org/officeDocument/2006/customXml" ds:itemID="{561E720F-F05D-4536-9C34-0CFCED65D3B7}">
-  <ds:schemaRefs>
-    <ds:schemaRef ds:uri="http://schemas.microsoft.com/sharepoint/v3/contenttype/forms"/>
-  </ds:schemaRefs>
-</ds:datastoreItem>
-</file>
-
-<file path=customXml/itemProps2.xml><?xml version="1.0" encoding="utf-8"?>
 <ds:datastoreItem xmlns:ds="http://schemas.openxmlformats.org/officeDocument/2006/customXml" ds:itemID="{8CDDBB83-77C1-4099-A0AA-289882E745E2}">
   <ds:schemaRefs>
     <ds:schemaRef ds:uri="http://schemas.microsoft.com/office/infopath/2007/PartnerControls"/>
@@ -15808,6 +15800,14 @@
     <ds:schemaRef ds:uri="http://schemas.openxmlformats.org/package/2006/metadata/core-properties"/>
     <ds:schemaRef ds:uri="http://schemas.microsoft.com/office/2006/metadata/properties"/>
     <ds:schemaRef ds:uri="http://www.w3.org/XML/1998/namespace"/>
+  </ds:schemaRefs>
+</ds:datastoreItem>
+</file>
+
+<file path=customXml/itemProps2.xml><?xml version="1.0" encoding="utf-8"?>
+<ds:datastoreItem xmlns:ds="http://schemas.openxmlformats.org/officeDocument/2006/customXml" ds:itemID="{561E720F-F05D-4536-9C34-0CFCED65D3B7}">
+  <ds:schemaRefs>
+    <ds:schemaRef ds:uri="http://schemas.microsoft.com/sharepoint/v3/contenttype/forms"/>
   </ds:schemaRefs>
 </ds:datastoreItem>
 </file>

</xml_diff>